<commit_message>
latest slides, fixed code formatting
</commit_message>
<xml_diff>
--- a/Slides/devcon2014_async.pptx
+++ b/Slides/devcon2014_async.pptx
@@ -5,27 +5,24 @@
     <p:sldMasterId id="2147483648" r:id="rId4"/>
   </p:sldMasterIdLst>
   <p:notesMasterIdLst>
-    <p:notesMasterId r:id="rId20"/>
+    <p:notesMasterId r:id="rId17"/>
   </p:notesMasterIdLst>
   <p:handoutMasterIdLst>
-    <p:handoutMasterId r:id="rId21"/>
+    <p:handoutMasterId r:id="rId18"/>
   </p:handoutMasterIdLst>
   <p:sldIdLst>
     <p:sldId id="257" r:id="rId5"/>
     <p:sldId id="270" r:id="rId6"/>
-    <p:sldId id="256" r:id="rId7"/>
-    <p:sldId id="259" r:id="rId8"/>
-    <p:sldId id="271" r:id="rId9"/>
-    <p:sldId id="275" r:id="rId10"/>
-    <p:sldId id="274" r:id="rId11"/>
-    <p:sldId id="276" r:id="rId12"/>
-    <p:sldId id="269" r:id="rId13"/>
-    <p:sldId id="277" r:id="rId14"/>
-    <p:sldId id="278" r:id="rId15"/>
-    <p:sldId id="258" r:id="rId16"/>
-    <p:sldId id="262" r:id="rId17"/>
-    <p:sldId id="267" r:id="rId18"/>
-    <p:sldId id="264" r:id="rId19"/>
+    <p:sldId id="279" r:id="rId7"/>
+    <p:sldId id="280" r:id="rId8"/>
+    <p:sldId id="289" r:id="rId9"/>
+    <p:sldId id="283" r:id="rId10"/>
+    <p:sldId id="298" r:id="rId11"/>
+    <p:sldId id="299" r:id="rId12"/>
+    <p:sldId id="296" r:id="rId13"/>
+    <p:sldId id="297" r:id="rId14"/>
+    <p:sldId id="267" r:id="rId15"/>
+    <p:sldId id="264" r:id="rId16"/>
   </p:sldIdLst>
   <p:sldSz cx="12192000" cy="6858000"/>
   <p:notesSz cx="6858000" cy="9144000"/>
@@ -217,7 +214,7 @@
           <a:p>
             <a:fld id="{94239FBE-FC08-4336-9B53-CDE8BC5ED33D}" type="datetimeFigureOut">
               <a:rPr lang="ru-RU" smtClean="0"/>
-              <a:t>24.05.2014</a:t>
+              <a:t>29.05.2014</a:t>
             </a:fld>
             <a:endParaRPr lang="ru-RU"/>
           </a:p>
@@ -382,7 +379,7 @@
           <a:p>
             <a:fld id="{135EBF37-D0C5-4B7C-9D35-9D2E20CA27EC}" type="datetimeFigureOut">
               <a:rPr lang="ru-RU" smtClean="0"/>
-              <a:t>24.05.2014</a:t>
+              <a:t>29.05.2014</a:t>
             </a:fld>
             <a:endParaRPr lang="ru-RU"/>
           </a:p>
@@ -1071,7 +1068,7 @@
                   <a:spcPct val="0"/>
                 </a:spcAft>
               </a:pPr>
-              <a:t>5/24/2014 11:37 PM</a:t>
+              <a:t>5/29/2014 2:01 PM</a:t>
             </a:fld>
             <a:endParaRPr lang="en-US"/>
           </a:p>
@@ -1241,7 +1238,7 @@
                   <a:spcPct val="0"/>
                 </a:spcAft>
               </a:pPr>
-              <a:t>15</a:t>
+              <a:t>12</a:t>
             </a:fld>
             <a:endParaRPr lang="en-US"/>
           </a:p>
@@ -5631,14 +5628,14 @@
         </p:blipFill>
         <p:spPr>
           <a:xfrm>
-            <a:off x="8256588" y="9000"/>
-            <a:ext cx="3935412" cy="6839999"/>
+            <a:off x="6096000" y="9000"/>
+            <a:ext cx="6096000" cy="6840000"/>
           </a:xfrm>
         </p:spPr>
       </p:pic>
       <p:sp>
         <p:nvSpPr>
-          <p:cNvPr id="2" name="Title 1"/>
+          <p:cNvPr id="3" name="Title 2"/>
           <p:cNvSpPr>
             <a:spLocks noGrp="1"/>
           </p:cNvSpPr>
@@ -5646,18 +5643,21 @@
             <p:ph type="title"/>
           </p:nvPr>
         </p:nvSpPr>
-        <p:spPr/>
+        <p:spPr>
+          <a:solidFill>
+            <a:schemeClr val="bg2">
+              <a:lumMod val="25000"/>
+              <a:alpha val="70000"/>
+            </a:schemeClr>
+          </a:solidFill>
+        </p:spPr>
         <p:txBody>
           <a:bodyPr/>
           <a:lstStyle/>
           <a:p>
             <a:r>
-              <a:rPr lang="ru-RU" dirty="0"/>
-              <a:t>Будьте аккуратны с </a:t>
-            </a:r>
-            <a:r>
-              <a:rPr lang="ru-RU" dirty="0" smtClean="0"/>
-              <a:t>цветом подложки и текста.</a:t>
+              <a:rPr lang="ru-RU" dirty="0" smtClean="0"/>
+              <a:t>Вопросы?</a:t>
             </a:r>
             <a:endParaRPr lang="ru-RU" dirty="0"/>
           </a:p>
@@ -5666,7 +5666,7 @@
     </p:spTree>
     <p:extLst>
       <p:ext uri="{BB962C8B-B14F-4D97-AF65-F5344CB8AC3E}">
-        <p14:creationId xmlns:p14="http://schemas.microsoft.com/office/powerpoint/2010/main" val="1033598430"/>
+        <p14:creationId xmlns:p14="http://schemas.microsoft.com/office/powerpoint/2010/main" val="3450061444"/>
       </p:ext>
     </p:extLst>
   </p:cSld>
@@ -5700,186 +5700,6 @@
           <a:chExt cx="0" cy="0"/>
         </a:xfrm>
       </p:grpSpPr>
-      <p:pic>
-        <p:nvPicPr>
-          <p:cNvPr id="5" name="Content Placeholder 4"/>
-          <p:cNvPicPr>
-            <a:picLocks noGrp="1" noChangeAspect="1"/>
-          </p:cNvPicPr>
-          <p:nvPr>
-            <p:ph sz="quarter" idx="10"/>
-          </p:nvPr>
-        </p:nvPicPr>
-        <p:blipFill rotWithShape="1">
-          <a:blip r:embed="rId2" cstate="print">
-            <a:extLst>
-              <a:ext uri="{28A0092B-C50C-407E-A947-70E740481C1C}">
-                <a14:useLocalDpi xmlns:a14="http://schemas.microsoft.com/office/drawing/2010/main" val="0"/>
-              </a:ext>
-            </a:extLst>
-          </a:blip>
-          <a:srcRect/>
-          <a:stretch/>
-        </p:blipFill>
-        <p:spPr>
-          <a:xfrm>
-            <a:off x="8256588" y="9000"/>
-            <a:ext cx="3935412" cy="6839999"/>
-          </a:xfrm>
-        </p:spPr>
-      </p:pic>
-      <p:sp>
-        <p:nvSpPr>
-          <p:cNvPr id="3" name="Title 2"/>
-          <p:cNvSpPr>
-            <a:spLocks noGrp="1"/>
-          </p:cNvSpPr>
-          <p:nvPr>
-            <p:ph type="title"/>
-          </p:nvPr>
-        </p:nvSpPr>
-        <p:spPr>
-          <a:solidFill>
-            <a:srgbClr val="FF0000">
-              <a:alpha val="70000"/>
-            </a:srgbClr>
-          </a:solidFill>
-        </p:spPr>
-        <p:txBody>
-          <a:bodyPr/>
-          <a:lstStyle/>
-          <a:p>
-            <a:r>
-              <a:rPr lang="ru-RU" dirty="0"/>
-              <a:t>Будьте аккуратны с цветом подложки и текста.</a:t>
-            </a:r>
-          </a:p>
-        </p:txBody>
-      </p:sp>
-    </p:spTree>
-    <p:extLst>
-      <p:ext uri="{BB962C8B-B14F-4D97-AF65-F5344CB8AC3E}">
-        <p14:creationId xmlns:p14="http://schemas.microsoft.com/office/powerpoint/2010/main" val="2388953749"/>
-      </p:ext>
-    </p:extLst>
-  </p:cSld>
-  <p:clrMapOvr>
-    <a:masterClrMapping/>
-  </p:clrMapOvr>
-  <p:timing>
-    <p:tnLst>
-      <p:par>
-        <p:cTn id="1" dur="indefinite" restart="never" nodeType="tmRoot"/>
-      </p:par>
-    </p:tnLst>
-  </p:timing>
-</p:sld>
-</file>
-
-<file path=ppt/slides/slide12.xml><?xml version="1.0" encoding="utf-8"?>
-<p:sld xmlns:a="http://schemas.openxmlformats.org/drawingml/2006/main" xmlns:r="http://schemas.openxmlformats.org/officeDocument/2006/relationships" xmlns:p="http://schemas.openxmlformats.org/presentationml/2006/main">
-  <p:cSld>
-    <p:spTree>
-      <p:nvGrpSpPr>
-        <p:cNvPr id="1" name=""/>
-        <p:cNvGrpSpPr/>
-        <p:nvPr/>
-      </p:nvGrpSpPr>
-      <p:grpSpPr>
-        <a:xfrm>
-          <a:off x="0" y="0"/>
-          <a:ext cx="0" cy="0"/>
-          <a:chOff x="0" y="0"/>
-          <a:chExt cx="0" cy="0"/>
-        </a:xfrm>
-      </p:grpSpPr>
-      <p:sp>
-        <p:nvSpPr>
-          <p:cNvPr id="2" name="Заголовок 1"/>
-          <p:cNvSpPr>
-            <a:spLocks noGrp="1"/>
-          </p:cNvSpPr>
-          <p:nvPr>
-            <p:ph type="ctrTitle"/>
-          </p:nvPr>
-        </p:nvSpPr>
-        <p:spPr/>
-        <p:txBody>
-          <a:bodyPr>
-            <a:normAutofit/>
-          </a:bodyPr>
-          <a:lstStyle/>
-          <a:p>
-            <a:r>
-              <a:rPr lang="ru-RU" dirty="0" smtClean="0"/>
-              <a:t>НАЖИМАЕМ КНОПКИ И ТЫКАЕМ ПАЛЬЦАМИ</a:t>
-            </a:r>
-            <a:endParaRPr lang="ru-RU" dirty="0"/>
-          </a:p>
-        </p:txBody>
-      </p:sp>
-      <p:sp>
-        <p:nvSpPr>
-          <p:cNvPr id="4" name="Подзаголовок 3"/>
-          <p:cNvSpPr>
-            <a:spLocks noGrp="1"/>
-          </p:cNvSpPr>
-          <p:nvPr>
-            <p:ph type="subTitle" idx="1"/>
-          </p:nvPr>
-        </p:nvSpPr>
-        <p:spPr/>
-        <p:txBody>
-          <a:bodyPr>
-            <a:normAutofit/>
-          </a:bodyPr>
-          <a:lstStyle/>
-          <a:p>
-            <a:r>
-              <a:rPr lang="ru-RU" dirty="0" smtClean="0"/>
-              <a:t>Константин Кичинский</a:t>
-            </a:r>
-            <a:endParaRPr lang="ru-RU" dirty="0"/>
-          </a:p>
-        </p:txBody>
-      </p:sp>
-    </p:spTree>
-    <p:extLst>
-      <p:ext uri="{BB962C8B-B14F-4D97-AF65-F5344CB8AC3E}">
-        <p14:creationId xmlns:p14="http://schemas.microsoft.com/office/powerpoint/2010/main" val="2023245439"/>
-      </p:ext>
-    </p:extLst>
-  </p:cSld>
-  <p:clrMapOvr>
-    <a:masterClrMapping/>
-  </p:clrMapOvr>
-  <p:timing>
-    <p:tnLst>
-      <p:par>
-        <p:cTn id="1" dur="indefinite" restart="never" nodeType="tmRoot"/>
-      </p:par>
-    </p:tnLst>
-  </p:timing>
-</p:sld>
-</file>
-
-<file path=ppt/slides/slide13.xml><?xml version="1.0" encoding="utf-8"?>
-<p:sld xmlns:a="http://schemas.openxmlformats.org/drawingml/2006/main" xmlns:r="http://schemas.openxmlformats.org/officeDocument/2006/relationships" xmlns:p="http://schemas.openxmlformats.org/presentationml/2006/main">
-  <p:cSld>
-    <p:spTree>
-      <p:nvGrpSpPr>
-        <p:cNvPr id="1" name=""/>
-        <p:cNvGrpSpPr/>
-        <p:nvPr/>
-      </p:nvGrpSpPr>
-      <p:grpSpPr>
-        <a:xfrm>
-          <a:off x="0" y="0"/>
-          <a:ext cx="0" cy="0"/>
-          <a:chOff x="0" y="0"/>
-          <a:chExt cx="0" cy="0"/>
-        </a:xfrm>
-      </p:grpSpPr>
       <p:sp>
         <p:nvSpPr>
           <p:cNvPr id="4" name="Заголовок 3"/>
@@ -5896,8 +5716,8 @@
           <a:lstStyle/>
           <a:p>
             <a:r>
-              <a:rPr lang="ru-RU" dirty="0" err="1" smtClean="0"/>
-              <a:t>Кодим</a:t>
+              <a:rPr lang="ru-RU" dirty="0" smtClean="0"/>
+              <a:t>Контакты</a:t>
             </a:r>
             <a:endParaRPr lang="ru-RU" dirty="0"/>
           </a:p>
@@ -5916,591 +5736,25 @@
         <p:spPr/>
         <p:txBody>
           <a:bodyPr>
-            <a:normAutofit fontScale="92500" lnSpcReduction="10000"/>
+            <a:normAutofit/>
           </a:bodyPr>
           <a:lstStyle/>
           <a:p>
             <a:r>
-              <a:rPr lang="en-US" dirty="0" smtClean="0">
-                <a:solidFill>
-                  <a:schemeClr val="tx1">
-                    <a:lumMod val="25000"/>
-                    <a:lumOff val="75000"/>
-                  </a:schemeClr>
-                </a:solidFill>
-              </a:rPr>
-              <a:t>/</a:t>
-            </a:r>
-            <a:r>
-              <a:rPr lang="ru-RU" dirty="0" smtClean="0">
-                <a:solidFill>
-                  <a:schemeClr val="tx1">
-                    <a:lumMod val="25000"/>
-                    <a:lumOff val="75000"/>
-                  </a:schemeClr>
-                </a:solidFill>
-              </a:rPr>
-              <a:t>*</a:t>
-            </a:r>
-            <a:r>
-              <a:rPr lang="en-US" dirty="0" smtClean="0">
-                <a:solidFill>
-                  <a:schemeClr val="tx1">
-                    <a:lumMod val="25000"/>
-                    <a:lumOff val="75000"/>
-                  </a:schemeClr>
-                </a:solidFill>
-              </a:rPr>
-              <a:t> </a:t>
-            </a:r>
-            <a:r>
-              <a:rPr lang="ru-RU" dirty="0" smtClean="0">
-                <a:solidFill>
-                  <a:schemeClr val="tx1">
-                    <a:lumMod val="25000"/>
-                    <a:lumOff val="75000"/>
-                  </a:schemeClr>
-                </a:solidFill>
-              </a:rPr>
-              <a:t>1. Делайте разметку основных вещей (комментарии, ключевые слова, строки) </a:t>
-            </a:r>
-          </a:p>
-          <a:p>
-            <a:r>
-              <a:rPr lang="ru-RU" dirty="0" smtClean="0">
-                <a:solidFill>
-                  <a:schemeClr val="tx1">
-                    <a:lumMod val="25000"/>
-                    <a:lumOff val="75000"/>
-                  </a:schemeClr>
-                </a:solidFill>
-              </a:rPr>
-              <a:t>   2. Сокращайте код, чтобы было не больше 10-15 строчек, скрывайте неважное</a:t>
-            </a:r>
-          </a:p>
-          <a:p>
-            <a:r>
-              <a:rPr lang="ru-RU" dirty="0">
-                <a:solidFill>
-                  <a:schemeClr val="tx1">
-                    <a:lumMod val="25000"/>
-                    <a:lumOff val="75000"/>
-                  </a:schemeClr>
-                </a:solidFill>
-              </a:rPr>
-              <a:t> </a:t>
-            </a:r>
-            <a:r>
-              <a:rPr lang="ru-RU" dirty="0" smtClean="0">
-                <a:solidFill>
-                  <a:schemeClr val="tx1">
-                    <a:lumMod val="25000"/>
-                    <a:lumOff val="75000"/>
-                  </a:schemeClr>
-                </a:solidFill>
-              </a:rPr>
-              <a:t>  3. Длинный код разбивайте на несколько слайдов или показывайте в студии </a:t>
-            </a:r>
-            <a:r>
-              <a:rPr lang="ru-RU" dirty="0" smtClean="0">
-                <a:solidFill>
-                  <a:schemeClr val="tx1">
-                    <a:lumMod val="25000"/>
-                    <a:lumOff val="75000"/>
-                  </a:schemeClr>
-                </a:solidFill>
-                <a:sym typeface="Wingdings" panose="05000000000000000000" pitchFamily="2" charset="2"/>
-              </a:rPr>
-              <a:t></a:t>
-            </a:r>
-            <a:endParaRPr lang="ru-RU" dirty="0" smtClean="0">
-              <a:solidFill>
-                <a:schemeClr val="tx1">
-                  <a:lumMod val="25000"/>
-                  <a:lumOff val="75000"/>
-                </a:schemeClr>
-              </a:solidFill>
-            </a:endParaRPr>
-          </a:p>
-          <a:p>
-            <a:r>
-              <a:rPr lang="ru-RU" dirty="0" smtClean="0">
-                <a:solidFill>
-                  <a:schemeClr val="tx1">
-                    <a:lumMod val="25000"/>
-                    <a:lumOff val="75000"/>
-                  </a:schemeClr>
-                </a:solidFill>
-              </a:rPr>
-              <a:t>   4. Отмечайте, на что надо обратить внимание */</a:t>
-            </a:r>
-          </a:p>
-          <a:p>
-            <a:r>
-              <a:rPr lang="en-US" dirty="0" smtClean="0">
-                <a:solidFill>
-                  <a:schemeClr val="accent1">
-                    <a:lumMod val="60000"/>
-                    <a:lumOff val="40000"/>
-                  </a:schemeClr>
-                </a:solidFill>
-              </a:rPr>
-              <a:t>function </a:t>
-            </a:r>
-            <a:r>
-              <a:rPr lang="en-US" dirty="0" err="1" smtClean="0"/>
-              <a:t>getSharingDataRequestedHandler</a:t>
+              <a:rPr lang="ru-RU" dirty="0" smtClean="0"/>
+              <a:t>Евгений Агафонов</a:t>
+            </a:r>
+            <a:endParaRPr lang="ru-RU" dirty="0"/>
+          </a:p>
+          <a:p>
+            <a:pPr lvl="1"/>
+            <a:r>
+              <a:rPr lang="en-US" dirty="0"/>
+              <a:t>{ABBYY, Head of Education Products Development Group</a:t>
             </a:r>
             <a:r>
               <a:rPr lang="en-US" dirty="0" smtClean="0"/>
-              <a:t>(</a:t>
-            </a:r>
-            <a:r>
-              <a:rPr lang="en-US" dirty="0">
-                <a:effectLst>
-                  <a:glow rad="228600">
-                    <a:schemeClr val="accent3">
-                      <a:alpha val="40000"/>
-                    </a:schemeClr>
-                  </a:glow>
-                </a:effectLst>
-              </a:rPr>
-              <a:t>item</a:t>
-            </a:r>
-            <a:r>
-              <a:rPr lang="en-US" dirty="0" smtClean="0"/>
-              <a:t>) </a:t>
-            </a:r>
-            <a:r>
-              <a:rPr lang="en-US" dirty="0"/>
-              <a:t>{</a:t>
-            </a:r>
-          </a:p>
-          <a:p>
-            <a:pPr lvl="1"/>
-            <a:r>
-              <a:rPr lang="en-US" dirty="0" err="1">
-                <a:solidFill>
-                  <a:schemeClr val="accent1">
-                    <a:lumMod val="60000"/>
-                    <a:lumOff val="40000"/>
-                  </a:schemeClr>
-                </a:solidFill>
-              </a:rPr>
-              <a:t>var</a:t>
-            </a:r>
-            <a:r>
-              <a:rPr lang="en-US" dirty="0" smtClean="0"/>
-              <a:t> </a:t>
-            </a:r>
-            <a:r>
-              <a:rPr lang="en-US" dirty="0"/>
-              <a:t>handler = </a:t>
-            </a:r>
-            <a:r>
-              <a:rPr lang="en-US" dirty="0">
-                <a:solidFill>
-                  <a:schemeClr val="accent1">
-                    <a:lumMod val="60000"/>
-                    <a:lumOff val="40000"/>
-                  </a:schemeClr>
-                </a:solidFill>
-              </a:rPr>
-              <a:t>function</a:t>
-            </a:r>
-            <a:r>
-              <a:rPr lang="en-US" dirty="0"/>
-              <a:t> </a:t>
-            </a:r>
-            <a:r>
-              <a:rPr lang="en-US" dirty="0" err="1"/>
-              <a:t>onSharingDataRequested</a:t>
-            </a:r>
-            <a:r>
-              <a:rPr lang="en-US" dirty="0"/>
-              <a:t>(event) {</a:t>
-            </a:r>
-          </a:p>
-          <a:p>
-            <a:pPr lvl="2"/>
-            <a:r>
-              <a:rPr lang="en-US" dirty="0" err="1">
-                <a:solidFill>
-                  <a:schemeClr val="accent1">
-                    <a:lumMod val="60000"/>
-                    <a:lumOff val="40000"/>
-                  </a:schemeClr>
-                </a:solidFill>
-              </a:rPr>
-              <a:t>var</a:t>
-            </a:r>
-            <a:r>
-              <a:rPr lang="en-US" dirty="0" smtClean="0"/>
-              <a:t> </a:t>
-            </a:r>
-            <a:r>
-              <a:rPr lang="en-US" dirty="0"/>
-              <a:t>request = </a:t>
-            </a:r>
-            <a:r>
-              <a:rPr lang="en-US" dirty="0" err="1"/>
-              <a:t>event.request</a:t>
-            </a:r>
-            <a:r>
-              <a:rPr lang="en-US" dirty="0"/>
-              <a:t>;</a:t>
-            </a:r>
-          </a:p>
-          <a:p>
-            <a:pPr lvl="2"/>
-            <a:r>
-              <a:rPr lang="en-US" dirty="0" err="1">
-                <a:solidFill>
-                  <a:schemeClr val="accent1">
-                    <a:lumMod val="60000"/>
-                    <a:lumOff val="40000"/>
-                  </a:schemeClr>
-                </a:solidFill>
-              </a:rPr>
-              <a:t>var</a:t>
-            </a:r>
-            <a:r>
-              <a:rPr lang="en-US" dirty="0" smtClean="0"/>
-              <a:t> </a:t>
-            </a:r>
-            <a:r>
-              <a:rPr lang="en-US" dirty="0"/>
-              <a:t>text = </a:t>
-            </a:r>
-            <a:r>
-              <a:rPr lang="en-US" dirty="0" err="1"/>
-              <a:t>item.title</a:t>
-            </a:r>
-            <a:r>
-              <a:rPr lang="en-US" dirty="0"/>
-              <a:t>;</a:t>
-            </a:r>
-          </a:p>
-          <a:p>
-            <a:pPr lvl="2"/>
-            <a:r>
-              <a:rPr lang="en-US" dirty="0">
-                <a:solidFill>
-                  <a:schemeClr val="accent1">
-                    <a:lumMod val="60000"/>
-                    <a:lumOff val="40000"/>
-                  </a:schemeClr>
-                </a:solidFill>
-              </a:rPr>
-              <a:t>if</a:t>
-            </a:r>
-            <a:r>
-              <a:rPr lang="en-US" dirty="0" smtClean="0"/>
-              <a:t> </a:t>
-            </a:r>
-            <a:r>
-              <a:rPr lang="en-US" dirty="0"/>
-              <a:t>(</a:t>
-            </a:r>
-            <a:r>
-              <a:rPr lang="en-US" dirty="0" err="1">
-                <a:effectLst>
-                  <a:glow rad="228600">
-                    <a:schemeClr val="accent3">
-                      <a:satMod val="175000"/>
-                      <a:alpha val="40000"/>
-                    </a:schemeClr>
-                  </a:glow>
-                </a:effectLst>
-              </a:rPr>
-              <a:t>item</a:t>
-            </a:r>
-            <a:r>
-              <a:rPr lang="en-US" dirty="0" err="1"/>
-              <a:t>.link</a:t>
-            </a:r>
-            <a:r>
-              <a:rPr lang="en-US" dirty="0"/>
-              <a:t>) {</a:t>
-            </a:r>
-          </a:p>
-          <a:p>
-            <a:pPr lvl="3"/>
-            <a:r>
-              <a:rPr lang="en-US" dirty="0" smtClean="0"/>
-              <a:t>text </a:t>
-            </a:r>
-            <a:r>
-              <a:rPr lang="en-US" dirty="0"/>
-              <a:t>+= </a:t>
-            </a:r>
-            <a:r>
-              <a:rPr lang="en-US" dirty="0">
-                <a:solidFill>
-                  <a:schemeClr val="bg2">
-                    <a:lumMod val="25000"/>
-                  </a:schemeClr>
-                </a:solidFill>
-              </a:rPr>
-              <a:t>"\n\r" </a:t>
-            </a:r>
-            <a:r>
-              <a:rPr lang="en-US" dirty="0"/>
-              <a:t>+ </a:t>
-            </a:r>
-            <a:r>
-              <a:rPr lang="en-US" dirty="0" err="1">
-                <a:effectLst>
-                  <a:glow rad="228600">
-                    <a:schemeClr val="accent3">
-                      <a:satMod val="175000"/>
-                      <a:alpha val="40000"/>
-                    </a:schemeClr>
-                  </a:glow>
-                </a:effectLst>
-              </a:rPr>
-              <a:t>item</a:t>
-            </a:r>
-            <a:r>
-              <a:rPr lang="en-US" dirty="0" err="1"/>
-              <a:t>.link</a:t>
-            </a:r>
-            <a:r>
-              <a:rPr lang="en-US" dirty="0"/>
-              <a:t>;</a:t>
-            </a:r>
-          </a:p>
-          <a:p>
-            <a:pPr lvl="3"/>
-            <a:r>
-              <a:rPr lang="en-US" dirty="0" err="1" smtClean="0"/>
-              <a:t>request.data.setUri</a:t>
-            </a:r>
-            <a:r>
-              <a:rPr lang="en-US" dirty="0" smtClean="0"/>
-              <a:t>(</a:t>
-            </a:r>
-            <a:r>
-              <a:rPr lang="en-US" dirty="0">
-                <a:solidFill>
-                  <a:schemeClr val="accent1">
-                    <a:lumMod val="60000"/>
-                    <a:lumOff val="40000"/>
-                  </a:schemeClr>
-                </a:solidFill>
-              </a:rPr>
-              <a:t>new</a:t>
-            </a:r>
-            <a:r>
-              <a:rPr lang="en-US" dirty="0" smtClean="0"/>
-              <a:t> </a:t>
-            </a:r>
-            <a:r>
-              <a:rPr lang="en-US" dirty="0" err="1"/>
-              <a:t>Windows.Foundation.Uri</a:t>
-            </a:r>
-            <a:r>
-              <a:rPr lang="en-US" dirty="0"/>
-              <a:t>(</a:t>
-            </a:r>
-            <a:r>
-              <a:rPr lang="en-US" dirty="0" err="1">
-                <a:effectLst>
-                  <a:glow rad="228600">
-                    <a:schemeClr val="accent3">
-                      <a:satMod val="175000"/>
-                      <a:alpha val="40000"/>
-                    </a:schemeClr>
-                  </a:glow>
-                </a:effectLst>
-              </a:rPr>
-              <a:t>item</a:t>
-            </a:r>
-            <a:r>
-              <a:rPr lang="en-US" dirty="0" err="1"/>
-              <a:t>.link</a:t>
-            </a:r>
-            <a:r>
-              <a:rPr lang="en-US" dirty="0"/>
-              <a:t>));</a:t>
-            </a:r>
-          </a:p>
-          <a:p>
-            <a:pPr lvl="2"/>
-            <a:r>
-              <a:rPr lang="ru-RU" dirty="0" smtClean="0"/>
               <a:t>}</a:t>
-            </a:r>
-            <a:endParaRPr lang="ru-RU" dirty="0"/>
-          </a:p>
-          <a:p>
-            <a:pPr lvl="2"/>
-            <a:r>
-              <a:rPr lang="en-US" dirty="0" err="1" smtClean="0"/>
-              <a:t>request.data.properties.title</a:t>
-            </a:r>
-            <a:r>
-              <a:rPr lang="en-US" dirty="0" smtClean="0"/>
-              <a:t> </a:t>
-            </a:r>
-            <a:r>
-              <a:rPr lang="en-US" dirty="0"/>
-              <a:t>= text;</a:t>
-            </a:r>
-          </a:p>
-          <a:p>
-            <a:pPr lvl="2"/>
-            <a:r>
-              <a:rPr lang="en-US" dirty="0" smtClean="0">
-                <a:solidFill>
-                  <a:schemeClr val="accent1"/>
-                </a:solidFill>
-              </a:rPr>
-              <a:t>// … </a:t>
-            </a:r>
-            <a:r>
-              <a:rPr lang="ru-RU" dirty="0" smtClean="0">
-                <a:solidFill>
-                  <a:schemeClr val="accent1"/>
-                </a:solidFill>
-              </a:rPr>
-              <a:t>и другие свойства</a:t>
-            </a:r>
-            <a:endParaRPr lang="en-US" dirty="0">
-              <a:solidFill>
-                <a:schemeClr val="accent1"/>
-              </a:solidFill>
-            </a:endParaRPr>
-          </a:p>
-          <a:p>
-            <a:pPr lvl="1"/>
-            <a:r>
-              <a:rPr lang="ru-RU" dirty="0" smtClean="0"/>
-              <a:t>};</a:t>
-            </a:r>
-            <a:endParaRPr lang="ru-RU" dirty="0"/>
-          </a:p>
-          <a:p>
-            <a:pPr lvl="1"/>
-            <a:r>
-              <a:rPr lang="en-US" dirty="0">
-                <a:solidFill>
-                  <a:schemeClr val="accent1">
-                    <a:lumMod val="60000"/>
-                    <a:lumOff val="40000"/>
-                  </a:schemeClr>
-                </a:solidFill>
-              </a:rPr>
-              <a:t>return</a:t>
-            </a:r>
-            <a:r>
-              <a:rPr lang="en-US" dirty="0" smtClean="0"/>
-              <a:t> </a:t>
-            </a:r>
-            <a:r>
-              <a:rPr lang="en-US" dirty="0"/>
-              <a:t>handler;        </a:t>
-            </a:r>
-          </a:p>
-          <a:p>
-            <a:r>
-              <a:rPr lang="ru-RU" dirty="0" smtClean="0"/>
-              <a:t>}</a:t>
-            </a:r>
-            <a:endParaRPr lang="ru-RU" dirty="0"/>
-          </a:p>
-        </p:txBody>
-      </p:sp>
-    </p:spTree>
-    <p:extLst>
-      <p:ext uri="{BB962C8B-B14F-4D97-AF65-F5344CB8AC3E}">
-        <p14:creationId xmlns:p14="http://schemas.microsoft.com/office/powerpoint/2010/main" val="3341480692"/>
-      </p:ext>
-    </p:extLst>
-  </p:cSld>
-  <p:clrMapOvr>
-    <a:masterClrMapping/>
-  </p:clrMapOvr>
-  <p:timing>
-    <p:tnLst>
-      <p:par>
-        <p:cTn id="1" dur="indefinite" restart="never" nodeType="tmRoot"/>
-      </p:par>
-    </p:tnLst>
-  </p:timing>
-</p:sld>
-</file>
-
-<file path=ppt/slides/slide14.xml><?xml version="1.0" encoding="utf-8"?>
-<p:sld xmlns:a="http://schemas.openxmlformats.org/drawingml/2006/main" xmlns:r="http://schemas.openxmlformats.org/officeDocument/2006/relationships" xmlns:p="http://schemas.openxmlformats.org/presentationml/2006/main">
-  <p:cSld>
-    <p:spTree>
-      <p:nvGrpSpPr>
-        <p:cNvPr id="1" name=""/>
-        <p:cNvGrpSpPr/>
-        <p:nvPr/>
-      </p:nvGrpSpPr>
-      <p:grpSpPr>
-        <a:xfrm>
-          <a:off x="0" y="0"/>
-          <a:ext cx="0" cy="0"/>
-          <a:chOff x="0" y="0"/>
-          <a:chExt cx="0" cy="0"/>
-        </a:xfrm>
-      </p:grpSpPr>
-      <p:sp>
-        <p:nvSpPr>
-          <p:cNvPr id="4" name="Заголовок 3"/>
-          <p:cNvSpPr>
-            <a:spLocks noGrp="1"/>
-          </p:cNvSpPr>
-          <p:nvPr>
-            <p:ph type="title"/>
-          </p:nvPr>
-        </p:nvSpPr>
-        <p:spPr/>
-        <p:txBody>
-          <a:bodyPr/>
-          <a:lstStyle/>
-          <a:p>
-            <a:r>
-              <a:rPr lang="ru-RU" dirty="0" smtClean="0"/>
-              <a:t>Контакты</a:t>
-            </a:r>
-            <a:endParaRPr lang="ru-RU" dirty="0"/>
-          </a:p>
-        </p:txBody>
-      </p:sp>
-      <p:sp>
-        <p:nvSpPr>
-          <p:cNvPr id="5" name="Объект 4"/>
-          <p:cNvSpPr>
-            <a:spLocks noGrp="1"/>
-          </p:cNvSpPr>
-          <p:nvPr>
-            <p:ph idx="1"/>
-          </p:nvPr>
-        </p:nvSpPr>
-        <p:spPr/>
-        <p:txBody>
-          <a:bodyPr/>
-          <a:lstStyle/>
-          <a:p>
-            <a:r>
-              <a:rPr lang="ru-RU" dirty="0"/>
-              <a:t>Константин </a:t>
-            </a:r>
-            <a:r>
-              <a:rPr lang="ru-RU" dirty="0" err="1"/>
-              <a:t>Кичинский</a:t>
-            </a:r>
-            <a:endParaRPr lang="ru-RU" dirty="0"/>
-          </a:p>
-          <a:p>
-            <a:pPr lvl="1"/>
-            <a:r>
-              <a:rPr lang="en-US" dirty="0" smtClean="0"/>
-              <a:t>{Microsoft Russia, DX}</a:t>
             </a:r>
             <a:endParaRPr lang="en-US" dirty="0"/>
           </a:p>
@@ -6510,7 +5764,7 @@
               <a:rPr lang="en-US" dirty="0" smtClean="0">
                 <a:hlinkClick r:id="rId2"/>
               </a:rPr>
-              <a:t>konkich@microsoft.com</a:t>
+              <a:t>eugene_a@abbyy.com</a:t>
             </a:r>
             <a:r>
               <a:rPr lang="en-US" dirty="0"/>
@@ -6530,7 +5784,7 @@
               <a:rPr lang="en-US" dirty="0" err="1" smtClean="0">
                 <a:hlinkClick r:id="rId3"/>
               </a:rPr>
-              <a:t>kichinsky</a:t>
+              <a:t>eugene_agafonov</a:t>
             </a:r>
             <a:r>
               <a:rPr lang="en-US" dirty="0" smtClean="0"/>
@@ -6540,12 +5794,9 @@
               <a:rPr lang="en-US" dirty="0" smtClean="0">
                 <a:hlinkClick r:id="rId4"/>
               </a:rPr>
-              <a:t>outofline.ru</a:t>
-            </a:r>
-            <a:r>
-              <a:rPr lang="en-US" dirty="0" smtClean="0"/>
-              <a:t> </a:t>
-            </a:r>
+              <a:t>eugeneagafonov.com</a:t>
+            </a:r>
+            <a:endParaRPr lang="en-US" dirty="0" smtClean="0"/>
           </a:p>
         </p:txBody>
       </p:sp>
@@ -6594,7 +5845,7 @@
 </p:sld>
 </file>
 
-<file path=ppt/slides/slide15.xml><?xml version="1.0" encoding="utf-8"?>
+<file path=ppt/slides/slide12.xml><?xml version="1.0" encoding="utf-8"?>
 <p:sld xmlns:a="http://schemas.openxmlformats.org/drawingml/2006/main" xmlns:r="http://schemas.openxmlformats.org/officeDocument/2006/relationships" xmlns:p="http://schemas.openxmlformats.org/presentationml/2006/main">
   <p:cSld>
     <p:spTree>
@@ -6669,13 +5920,29 @@
         <p:spPr/>
         <p:txBody>
           <a:bodyPr>
-            <a:normAutofit/>
+            <a:normAutofit fontScale="90000"/>
           </a:bodyPr>
           <a:lstStyle/>
           <a:p>
             <a:r>
-              <a:rPr lang="ru-RU" dirty="0" smtClean="0"/>
-              <a:t>ОТКРЫТИЕ КОНФЕРЕНЦИИ ПЛАНЕРНЫЙ ДОКЛАД</a:t>
+              <a:rPr lang="ru-RU" dirty="0"/>
+              <a:t>Глубокое погружение в инфраструктуру асинхронного </a:t>
+            </a:r>
+            <a:r>
+              <a:rPr lang="ru-RU" dirty="0" smtClean="0"/>
+              <a:t>ввода-вывода</a:t>
+            </a:r>
+            <a:r>
+              <a:rPr lang="en-US" dirty="0" smtClean="0"/>
+              <a:t> </a:t>
+            </a:r>
+            <a:r>
+              <a:rPr lang="ru-RU" dirty="0" smtClean="0"/>
+              <a:t>на платформе .</a:t>
+            </a:r>
+            <a:r>
+              <a:rPr lang="en-US" dirty="0" smtClean="0"/>
+              <a:t>NET</a:t>
             </a:r>
             <a:endParaRPr lang="en-US" dirty="0"/>
           </a:p>
@@ -6693,35 +5960,25 @@
         </p:nvSpPr>
         <p:spPr/>
         <p:txBody>
-          <a:bodyPr/>
+          <a:bodyPr>
+            <a:normAutofit fontScale="85000" lnSpcReduction="10000"/>
+          </a:bodyPr>
           <a:lstStyle/>
           <a:p>
             <a:pPr lvl="0"/>
             <a:r>
+              <a:rPr lang="ru-RU" dirty="0" smtClean="0"/>
+              <a:t>Евгений Агафонов</a:t>
+            </a:r>
+            <a:r>
               <a:rPr lang="en-US" dirty="0" smtClean="0"/>
-              <a:t>Giorgio Sardo </a:t>
+              <a:t> </a:t>
             </a:r>
             <a:r>
               <a:rPr lang="en-US" sz="2400" dirty="0" smtClean="0"/>
-              <a:t>{Microsoft Corp. | DX</a:t>
-            </a:r>
-            <a:r>
-              <a:rPr lang="ru-RU" sz="2400" dirty="0" smtClean="0"/>
-              <a:t> </a:t>
-            </a:r>
-            <a:r>
-              <a:rPr lang="en-US" sz="2400" smtClean="0"/>
-              <a:t>| </a:t>
-            </a:r>
-            <a:r>
-              <a:rPr lang="en-US" sz="2400"/>
-              <a:t>Senior </a:t>
-            </a:r>
-            <a:r>
-              <a:rPr lang="en-US" sz="2400" smtClean="0"/>
-              <a:t>Director}</a:t>
-            </a:r>
-            <a:endParaRPr lang="ru-RU" sz="2400" dirty="0"/>
+              <a:t>{ABBYY, Head of Education Products Development Group}</a:t>
+            </a:r>
+            <a:endParaRPr lang="ru-RU" sz="2400" dirty="0" smtClean="0"/>
           </a:p>
           <a:p>
             <a:endParaRPr lang="en-US" dirty="0"/>
@@ -6782,40 +6039,9 @@
           </a:bodyPr>
           <a:lstStyle/>
           <a:p>
-            <a:pPr>
-              <a:lnSpc>
-                <a:spcPct val="100000"/>
-              </a:lnSpc>
-            </a:pPr>
-            <a:r>
-              <a:rPr lang="ru-RU" dirty="0" smtClean="0"/>
-              <a:t>ТЫК-ТЫК, ЖМАК-ЖМАК, </a:t>
-            </a:r>
-            <a:r>
-              <a:rPr lang="en-US" dirty="0" smtClean="0"/>
-              <a:t/>
-            </a:r>
-            <a:br>
-              <a:rPr lang="en-US" dirty="0" smtClean="0"/>
-            </a:br>
-            <a:r>
-              <a:rPr lang="ru-RU" dirty="0" smtClean="0"/>
-              <a:t>ИЛИ КАК ПОДГОТОВИТЬ САЙТ </a:t>
-            </a:r>
-            <a:r>
-              <a:rPr lang="en-US" dirty="0" smtClean="0"/>
-              <a:t/>
-            </a:r>
-            <a:br>
-              <a:rPr lang="en-US" dirty="0" smtClean="0"/>
-            </a:br>
-            <a:r>
-              <a:rPr lang="ru-RU" dirty="0" smtClean="0"/>
-              <a:t>К </a:t>
-            </a:r>
-            <a:r>
-              <a:rPr lang="en-US" dirty="0" smtClean="0"/>
-              <a:t>WINDOWS 8</a:t>
+            <a:r>
+              <a:rPr lang="ru-RU" dirty="0" smtClean="0"/>
+              <a:t>ЕВГЕНИЙ АГАФОНОВ</a:t>
             </a:r>
             <a:endParaRPr lang="ru-RU" dirty="0"/>
           </a:p>
@@ -6831,37 +6057,72 @@
             <p:ph type="subTitle" idx="1"/>
           </p:nvPr>
         </p:nvSpPr>
-        <p:spPr/>
+        <p:spPr>
+          <a:xfrm>
+            <a:off x="0" y="4149000"/>
+            <a:ext cx="12192000" cy="862114"/>
+          </a:xfrm>
+        </p:spPr>
         <p:txBody>
-          <a:bodyPr>
-            <a:normAutofit/>
-          </a:bodyPr>
+          <a:bodyPr/>
           <a:lstStyle/>
           <a:p>
-            <a:r>
-              <a:rPr lang="ru-RU" dirty="0" smtClean="0"/>
-              <a:t>Константин Кичинский</a:t>
-            </a:r>
+            <a:pPr marL="0" indent="0">
+              <a:buNone/>
+            </a:pPr>
             <a:r>
               <a:rPr lang="en-US" dirty="0" smtClean="0"/>
-              <a:t> </a:t>
-            </a:r>
-            <a:r>
-              <a:rPr lang="en-US" sz="2400" dirty="0"/>
               <a:t>{</a:t>
             </a:r>
             <a:r>
-              <a:rPr lang="en-US" sz="2400" dirty="0" smtClean="0"/>
-              <a:t>Microsoft | DX | Technical Evangelist}</a:t>
-            </a:r>
-            <a:endParaRPr lang="ru-RU" sz="2400" dirty="0"/>
+              <a:rPr lang="en-US" sz="3200" dirty="0" smtClean="0"/>
+              <a:t>ABBYY</a:t>
+            </a:r>
+            <a:r>
+              <a:rPr lang="en-US" sz="3200" dirty="0"/>
+              <a:t>, Head of Education Products Development Group</a:t>
+            </a:r>
+            <a:r>
+              <a:rPr lang="en-US" dirty="0"/>
+              <a:t>}</a:t>
+            </a:r>
+            <a:endParaRPr lang="ru-RU" dirty="0"/>
           </a:p>
         </p:txBody>
       </p:sp>
+      <p:pic>
+        <p:nvPicPr>
+          <p:cNvPr id="3" name="Рисунок 2"/>
+          <p:cNvPicPr>
+            <a:picLocks noGrp="1" noChangeAspect="1"/>
+          </p:cNvPicPr>
+          <p:nvPr>
+            <p:ph type="pic" sz="quarter" idx="10"/>
+          </p:nvPr>
+        </p:nvPicPr>
+        <p:blipFill>
+          <a:blip r:embed="rId2" cstate="print">
+            <a:extLst>
+              <a:ext uri="{28A0092B-C50C-407E-A947-70E740481C1C}">
+                <a14:useLocalDpi xmlns:a14="http://schemas.microsoft.com/office/drawing/2010/main" val="0"/>
+              </a:ext>
+            </a:extLst>
+          </a:blip>
+          <a:stretch>
+            <a:fillRect/>
+          </a:stretch>
+        </p:blipFill>
+        <p:spPr>
+          <a:xfrm>
+            <a:off x="9651983" y="1656000"/>
+            <a:ext cx="2157770" cy="2160587"/>
+          </a:xfrm>
+        </p:spPr>
+      </p:pic>
     </p:spTree>
     <p:extLst>
       <p:ext uri="{BB962C8B-B14F-4D97-AF65-F5344CB8AC3E}">
-        <p14:creationId xmlns:p14="http://schemas.microsoft.com/office/powerpoint/2010/main" val="1714819322"/>
+        <p14:creationId xmlns:p14="http://schemas.microsoft.com/office/powerpoint/2010/main" val="3087406956"/>
       </p:ext>
     </p:extLst>
   </p:cSld>
@@ -6912,11 +6173,7 @@
           <a:p>
             <a:r>
               <a:rPr lang="ru-RU" dirty="0" smtClean="0"/>
-              <a:t>Когда тыкать и когда </a:t>
-            </a:r>
-            <a:r>
-              <a:rPr lang="ru-RU" dirty="0" err="1" smtClean="0"/>
-              <a:t>жмакать</a:t>
+              <a:t>О чем пойдет речь</a:t>
             </a:r>
             <a:endParaRPr lang="ru-RU" dirty="0"/>
           </a:p>
@@ -6941,64 +6198,87 @@
           <a:p>
             <a:r>
               <a:rPr lang="ru-RU" dirty="0" smtClean="0"/>
-              <a:t>Старайтесь не использовать списки, сделанные вручную</a:t>
-            </a:r>
-          </a:p>
-          <a:p>
-            <a:pPr lvl="1"/>
-            <a:r>
-              <a:rPr lang="ru-RU" dirty="0" smtClean="0"/>
-              <a:t>Если можно, ограничивайтесь уровнями текста, регулируя в </a:t>
+              <a:t>Почему вообще это важно</a:t>
+            </a:r>
+          </a:p>
+          <a:p>
+            <a:r>
+              <a:rPr lang="ru-RU" dirty="0" smtClean="0"/>
+              <a:t>Отличие С</a:t>
             </a:r>
             <a:r>
               <a:rPr lang="en-US" dirty="0" smtClean="0"/>
-              <a:t>PowerPoint </a:t>
-            </a:r>
-            <a:r>
-              <a:rPr lang="ru-RU" dirty="0" smtClean="0"/>
-              <a:t>отступы</a:t>
-            </a:r>
-          </a:p>
-          <a:p>
-            <a:pPr lvl="2"/>
-            <a:r>
-              <a:rPr lang="ru-RU" dirty="0" smtClean="0"/>
-              <a:t>Это такие две кнопочки со стрелочками (не путать с табуляцией)</a:t>
-            </a:r>
-          </a:p>
-          <a:p>
-            <a:pPr lvl="2"/>
-            <a:r>
-              <a:rPr lang="ru-RU" dirty="0" smtClean="0"/>
-              <a:t>Нажимая их, вы будете автоматически получать правильные отступы из шаблона</a:t>
-            </a:r>
-          </a:p>
-          <a:p>
-            <a:pPr lvl="1"/>
-            <a:r>
-              <a:rPr lang="ru-RU" dirty="0" smtClean="0"/>
-              <a:t>Не используйте списки глубиной более 3 уровней</a:t>
-            </a:r>
-          </a:p>
-          <a:p>
-            <a:r>
-              <a:rPr lang="ru-RU" dirty="0" smtClean="0"/>
-              <a:t>В шаблоне есть два макета для обычных слайдов:</a:t>
-            </a:r>
-          </a:p>
-          <a:p>
-            <a:pPr lvl="1"/>
-            <a:r>
-              <a:rPr lang="ru-RU" dirty="0" smtClean="0"/>
-              <a:t>Традиционный с маркированными списками</a:t>
-            </a:r>
-          </a:p>
-          <a:p>
-            <a:pPr lvl="1"/>
-            <a:r>
-              <a:rPr lang="ru-RU" dirty="0" smtClean="0"/>
-              <a:t>Новый – без маркеров на 1 и 2 уровнях (как этот)</a:t>
-            </a:r>
+              <a:t>PU </a:t>
+            </a:r>
+            <a:r>
+              <a:rPr lang="ru-RU" dirty="0" smtClean="0"/>
+              <a:t>и </a:t>
+            </a:r>
+            <a:r>
+              <a:rPr lang="en-US" dirty="0" smtClean="0"/>
+              <a:t>I/O bound </a:t>
+            </a:r>
+            <a:r>
+              <a:rPr lang="ru-RU" dirty="0" smtClean="0"/>
+              <a:t>асинхронных операций</a:t>
+            </a:r>
+          </a:p>
+          <a:p>
+            <a:r>
+              <a:rPr lang="ru-RU" dirty="0" smtClean="0"/>
+              <a:t>Аспекты асинхронного </a:t>
+            </a:r>
+            <a:r>
+              <a:rPr lang="en-US" dirty="0" smtClean="0"/>
+              <a:t>I/O API </a:t>
+            </a:r>
+            <a:r>
+              <a:rPr lang="ru-RU" dirty="0" smtClean="0"/>
+              <a:t>в </a:t>
+            </a:r>
+            <a:r>
+              <a:rPr lang="en-US" dirty="0" smtClean="0"/>
+              <a:t>.NET </a:t>
+            </a:r>
+            <a:endParaRPr lang="ru-RU" dirty="0" smtClean="0"/>
+          </a:p>
+          <a:p>
+            <a:r>
+              <a:rPr lang="ru-RU" dirty="0" smtClean="0"/>
+              <a:t>Особенности асинхронной инфраструктуры в </a:t>
+            </a:r>
+            <a:r>
+              <a:rPr lang="en-US" dirty="0" smtClean="0"/>
+              <a:t>C#</a:t>
+            </a:r>
+            <a:endParaRPr lang="ru-RU" dirty="0"/>
+          </a:p>
+          <a:p>
+            <a:r>
+              <a:rPr lang="ru-RU" dirty="0" smtClean="0"/>
+              <a:t>Длительные </a:t>
+            </a:r>
+            <a:r>
+              <a:rPr lang="ru-RU" dirty="0" smtClean="0"/>
+              <a:t>операции на сервере</a:t>
+            </a:r>
+            <a:endParaRPr lang="en-US" dirty="0" smtClean="0"/>
+          </a:p>
+          <a:p>
+            <a:r>
+              <a:rPr lang="ru-RU" dirty="0" smtClean="0"/>
+              <a:t>Много кода мало слайдов </a:t>
+            </a:r>
+            <a:r>
+              <a:rPr lang="ru-RU" dirty="0" smtClean="0">
+                <a:sym typeface="Wingdings" panose="05000000000000000000" pitchFamily="2" charset="2"/>
+              </a:rPr>
+              <a:t></a:t>
+            </a:r>
+            <a:endParaRPr lang="en-US" dirty="0" smtClean="0"/>
+          </a:p>
+          <a:p>
+            <a:endParaRPr lang="ru-RU" dirty="0" smtClean="0"/>
           </a:p>
           <a:p>
             <a:pPr lvl="1"/>
@@ -7009,7 +6289,7 @@
     </p:spTree>
     <p:extLst>
       <p:ext uri="{BB962C8B-B14F-4D97-AF65-F5344CB8AC3E}">
-        <p14:creationId xmlns:p14="http://schemas.microsoft.com/office/powerpoint/2010/main" val="1752826016"/>
+        <p14:creationId xmlns:p14="http://schemas.microsoft.com/office/powerpoint/2010/main" val="2752271205"/>
       </p:ext>
     </p:extLst>
   </p:cSld>
@@ -7027,195 +6307,6 @@
 </file>
 
 <file path=ppt/slides/slide5.xml><?xml version="1.0" encoding="utf-8"?>
-<p:sld xmlns:a="http://schemas.openxmlformats.org/drawingml/2006/main" xmlns:r="http://schemas.openxmlformats.org/officeDocument/2006/relationships" xmlns:p="http://schemas.openxmlformats.org/presentationml/2006/main">
-  <p:cSld>
-    <p:spTree>
-      <p:nvGrpSpPr>
-        <p:cNvPr id="1" name=""/>
-        <p:cNvGrpSpPr/>
-        <p:nvPr/>
-      </p:nvGrpSpPr>
-      <p:grpSpPr>
-        <a:xfrm>
-          <a:off x="0" y="0"/>
-          <a:ext cx="0" cy="0"/>
-          <a:chOff x="0" y="0"/>
-          <a:chExt cx="0" cy="0"/>
-        </a:xfrm>
-      </p:grpSpPr>
-      <p:sp>
-        <p:nvSpPr>
-          <p:cNvPr id="4" name="Title 3"/>
-          <p:cNvSpPr>
-            <a:spLocks noGrp="1"/>
-          </p:cNvSpPr>
-          <p:nvPr>
-            <p:ph type="ctrTitle"/>
-          </p:nvPr>
-        </p:nvSpPr>
-        <p:spPr/>
-        <p:txBody>
-          <a:bodyPr/>
-          <a:lstStyle/>
-          <a:p>
-            <a:r>
-              <a:rPr lang="en-US" dirty="0" smtClean="0"/>
-              <a:t>1. Next section</a:t>
-            </a:r>
-            <a:endParaRPr lang="ru-RU" dirty="0"/>
-          </a:p>
-        </p:txBody>
-      </p:sp>
-      <p:sp>
-        <p:nvSpPr>
-          <p:cNvPr id="5" name="Subtitle 4"/>
-          <p:cNvSpPr>
-            <a:spLocks noGrp="1"/>
-          </p:cNvSpPr>
-          <p:nvPr>
-            <p:ph type="subTitle" idx="1"/>
-          </p:nvPr>
-        </p:nvSpPr>
-        <p:spPr/>
-        <p:txBody>
-          <a:bodyPr/>
-          <a:lstStyle/>
-          <a:p>
-            <a:endParaRPr lang="ru-RU"/>
-          </a:p>
-        </p:txBody>
-      </p:sp>
-    </p:spTree>
-    <p:extLst>
-      <p:ext uri="{BB962C8B-B14F-4D97-AF65-F5344CB8AC3E}">
-        <p14:creationId xmlns:p14="http://schemas.microsoft.com/office/powerpoint/2010/main" val="187153265"/>
-      </p:ext>
-    </p:extLst>
-  </p:cSld>
-  <p:clrMapOvr>
-    <a:masterClrMapping/>
-  </p:clrMapOvr>
-  <p:timing>
-    <p:tnLst>
-      <p:par>
-        <p:cTn id="1" dur="indefinite" restart="never" nodeType="tmRoot"/>
-      </p:par>
-    </p:tnLst>
-  </p:timing>
-</p:sld>
-</file>
-
-<file path=ppt/slides/slide6.xml><?xml version="1.0" encoding="utf-8"?>
-<p:sld xmlns:a="http://schemas.openxmlformats.org/drawingml/2006/main" xmlns:r="http://schemas.openxmlformats.org/officeDocument/2006/relationships" xmlns:p="http://schemas.openxmlformats.org/presentationml/2006/main">
-  <p:cSld>
-    <p:spTree>
-      <p:nvGrpSpPr>
-        <p:cNvPr id="1" name=""/>
-        <p:cNvGrpSpPr/>
-        <p:nvPr/>
-      </p:nvGrpSpPr>
-      <p:grpSpPr>
-        <a:xfrm>
-          <a:off x="0" y="0"/>
-          <a:ext cx="0" cy="0"/>
-          <a:chOff x="0" y="0"/>
-          <a:chExt cx="0" cy="0"/>
-        </a:xfrm>
-      </p:grpSpPr>
-      <p:pic>
-        <p:nvPicPr>
-          <p:cNvPr id="8" name="Content Placeholder 7"/>
-          <p:cNvPicPr>
-            <a:picLocks noGrp="1" noChangeAspect="1"/>
-          </p:cNvPicPr>
-          <p:nvPr>
-            <p:ph sz="quarter" idx="10"/>
-          </p:nvPr>
-        </p:nvPicPr>
-        <p:blipFill>
-          <a:blip r:embed="rId2" cstate="screen">
-            <a:extLst>
-              <a:ext uri="{28A0092B-C50C-407E-A947-70E740481C1C}">
-                <a14:useLocalDpi xmlns:a14="http://schemas.microsoft.com/office/drawing/2010/main"/>
-              </a:ext>
-            </a:extLst>
-          </a:blip>
-          <a:stretch>
-            <a:fillRect/>
-          </a:stretch>
-        </p:blipFill>
-        <p:spPr>
-          <a:xfrm>
-            <a:off x="0" y="0"/>
-            <a:ext cx="12192000" cy="6858000"/>
-          </a:xfrm>
-        </p:spPr>
-      </p:pic>
-      <p:sp>
-        <p:nvSpPr>
-          <p:cNvPr id="3" name="Title 2"/>
-          <p:cNvSpPr>
-            <a:spLocks noGrp="1"/>
-          </p:cNvSpPr>
-          <p:nvPr>
-            <p:ph type="title"/>
-          </p:nvPr>
-        </p:nvSpPr>
-        <p:spPr>
-          <a:xfrm>
-            <a:off x="0" y="4536602"/>
-            <a:ext cx="12192000" cy="2056626"/>
-          </a:xfrm>
-          <a:solidFill>
-            <a:srgbClr val="FE1B8B">
-              <a:alpha val="69804"/>
-            </a:srgbClr>
-          </a:solidFill>
-        </p:spPr>
-        <p:txBody>
-          <a:bodyPr/>
-          <a:lstStyle/>
-          <a:p>
-            <a:r>
-              <a:rPr lang="ru-RU" dirty="0"/>
-              <a:t>Будьте аккуратны с цветом,</a:t>
-            </a:r>
-            <a:br>
-              <a:rPr lang="ru-RU" dirty="0"/>
-            </a:br>
-            <a:r>
-              <a:rPr lang="ru-RU" dirty="0"/>
-              <a:t>если нужна </a:t>
-            </a:r>
-            <a:r>
-              <a:rPr lang="ru-RU" dirty="0" smtClean="0"/>
-              <a:t>подпись.</a:t>
-            </a:r>
-            <a:endParaRPr lang="ru-RU" dirty="0"/>
-          </a:p>
-        </p:txBody>
-      </p:sp>
-    </p:spTree>
-    <p:extLst>
-      <p:ext uri="{BB962C8B-B14F-4D97-AF65-F5344CB8AC3E}">
-        <p14:creationId xmlns:p14="http://schemas.microsoft.com/office/powerpoint/2010/main" val="1570773299"/>
-      </p:ext>
-    </p:extLst>
-  </p:cSld>
-  <p:clrMapOvr>
-    <a:masterClrMapping/>
-  </p:clrMapOvr>
-  <p:timing>
-    <p:tnLst>
-      <p:par>
-        <p:cTn id="1" dur="indefinite" restart="never" nodeType="tmRoot"/>
-      </p:par>
-    </p:tnLst>
-  </p:timing>
-</p:sld>
-</file>
-
-<file path=ppt/slides/slide7.xml><?xml version="1.0" encoding="utf-8"?>
 <p:sld xmlns:a="http://schemas.openxmlformats.org/drawingml/2006/main" xmlns:r="http://schemas.openxmlformats.org/officeDocument/2006/relationships" xmlns:p="http://schemas.openxmlformats.org/presentationml/2006/main">
   <p:cSld>
     <p:spTree>
@@ -7273,8 +6364,8 @@
         </p:nvSpPr>
         <p:spPr>
           <a:xfrm>
-            <a:off x="0" y="4536602"/>
-            <a:ext cx="12192000" cy="2056626"/>
+            <a:off x="0" y="4869000"/>
+            <a:ext cx="12192000" cy="1391829"/>
           </a:xfrm>
           <a:solidFill>
             <a:schemeClr val="bg1">
@@ -7288,8 +6379,12 @@
           <a:lstStyle/>
           <a:p>
             <a:r>
-              <a:rPr lang="ru-RU" dirty="0" smtClean="0"/>
-              <a:t>Цвет подложки можно поменять. Если очень нужно…</a:t>
+              <a:rPr lang="en-US" dirty="0" smtClean="0"/>
+              <a:t>DEMO: </a:t>
+            </a:r>
+            <a:r>
+              <a:rPr lang="ru-RU" dirty="0" smtClean="0"/>
+              <a:t>Важность проблемы</a:t>
             </a:r>
             <a:endParaRPr lang="ru-RU" dirty="0"/>
           </a:p>
@@ -7298,7 +6393,388 @@
     </p:spTree>
     <p:extLst>
       <p:ext uri="{BB962C8B-B14F-4D97-AF65-F5344CB8AC3E}">
-        <p14:creationId xmlns:p14="http://schemas.microsoft.com/office/powerpoint/2010/main" val="775928876"/>
+        <p14:creationId xmlns:p14="http://schemas.microsoft.com/office/powerpoint/2010/main" val="3170069838"/>
+      </p:ext>
+    </p:extLst>
+  </p:cSld>
+  <p:clrMapOvr>
+    <a:masterClrMapping/>
+  </p:clrMapOvr>
+  <p:timing>
+    <p:tnLst>
+      <p:par>
+        <p:cTn id="1" dur="indefinite" restart="never" nodeType="tmRoot"/>
+      </p:par>
+    </p:tnLst>
+  </p:timing>
+</p:sld>
+</file>
+
+<file path=ppt/slides/slide6.xml><?xml version="1.0" encoding="utf-8"?>
+<p:sld xmlns:a="http://schemas.openxmlformats.org/drawingml/2006/main" xmlns:r="http://schemas.openxmlformats.org/officeDocument/2006/relationships" xmlns:p="http://schemas.openxmlformats.org/presentationml/2006/main">
+  <p:cSld>
+    <p:spTree>
+      <p:nvGrpSpPr>
+        <p:cNvPr id="1" name=""/>
+        <p:cNvGrpSpPr/>
+        <p:nvPr/>
+      </p:nvGrpSpPr>
+      <p:grpSpPr>
+        <a:xfrm>
+          <a:off x="0" y="0"/>
+          <a:ext cx="0" cy="0"/>
+          <a:chOff x="0" y="0"/>
+          <a:chExt cx="0" cy="0"/>
+        </a:xfrm>
+      </p:grpSpPr>
+      <p:sp>
+        <p:nvSpPr>
+          <p:cNvPr id="4" name="Заголовок 3"/>
+          <p:cNvSpPr>
+            <a:spLocks noGrp="1"/>
+          </p:cNvSpPr>
+          <p:nvPr>
+            <p:ph type="title"/>
+          </p:nvPr>
+        </p:nvSpPr>
+        <p:spPr/>
+        <p:txBody>
+          <a:bodyPr/>
+          <a:lstStyle/>
+          <a:p>
+            <a:r>
+              <a:rPr lang="en-US" dirty="0" smtClean="0"/>
+              <a:t>CPU bound </a:t>
+            </a:r>
+            <a:r>
+              <a:rPr lang="ru-RU" dirty="0" smtClean="0"/>
+              <a:t>операции</a:t>
+            </a:r>
+            <a:endParaRPr lang="ru-RU" dirty="0"/>
+          </a:p>
+        </p:txBody>
+      </p:sp>
+      <p:sp>
+        <p:nvSpPr>
+          <p:cNvPr id="5" name="Объект 4"/>
+          <p:cNvSpPr>
+            <a:spLocks noGrp="1"/>
+          </p:cNvSpPr>
+          <p:nvPr>
+            <p:ph idx="1"/>
+          </p:nvPr>
+        </p:nvSpPr>
+        <p:spPr/>
+        <p:txBody>
+          <a:bodyPr>
+            <a:normAutofit fontScale="77500" lnSpcReduction="20000"/>
+          </a:bodyPr>
+          <a:lstStyle/>
+          <a:p>
+            <a:r>
+              <a:rPr lang="ru-RU" dirty="0" smtClean="0"/>
+              <a:t>1. Пользователь присылает запрос</a:t>
+            </a:r>
+          </a:p>
+          <a:p>
+            <a:r>
+              <a:rPr lang="ru-RU" dirty="0" smtClean="0"/>
+              <a:t>2. Серверная платформа берет поток</a:t>
+            </a:r>
+            <a:r>
+              <a:rPr lang="en-US" dirty="0" smtClean="0"/>
+              <a:t> </a:t>
+            </a:r>
+            <a:r>
+              <a:rPr lang="ru-RU" dirty="0" smtClean="0"/>
+              <a:t>№1 из </a:t>
+            </a:r>
+            <a:r>
+              <a:rPr lang="en-US" dirty="0" err="1" smtClean="0"/>
+              <a:t>ThreadPool</a:t>
+            </a:r>
+            <a:r>
+              <a:rPr lang="ru-RU" dirty="0" smtClean="0"/>
+              <a:t>, и передает ему этот запрос</a:t>
+            </a:r>
+          </a:p>
+          <a:p>
+            <a:r>
+              <a:rPr lang="ru-RU" dirty="0" smtClean="0"/>
+              <a:t>3. Код в потоке начинает выполнять асинхронную операцию. При этом мы берем поток</a:t>
+            </a:r>
+            <a:r>
+              <a:rPr lang="en-US" dirty="0" smtClean="0"/>
+              <a:t> </a:t>
+            </a:r>
+            <a:r>
+              <a:rPr lang="ru-RU" dirty="0" smtClean="0"/>
+              <a:t>№2 из </a:t>
+            </a:r>
+            <a:r>
+              <a:rPr lang="en-US" dirty="0" err="1" smtClean="0"/>
+              <a:t>ThreadPool</a:t>
+            </a:r>
+            <a:r>
+              <a:rPr lang="en-US" dirty="0" smtClean="0"/>
+              <a:t>, </a:t>
+            </a:r>
+            <a:r>
+              <a:rPr lang="ru-RU" dirty="0" smtClean="0"/>
+              <a:t>передаем ему выполнение этой операции. Если далее мы просто ждем выполнения операции, то поток №1 возвращается в </a:t>
+            </a:r>
+            <a:r>
+              <a:rPr lang="en-US" dirty="0" err="1" smtClean="0"/>
+              <a:t>ThreadPool</a:t>
+            </a:r>
+            <a:r>
+              <a:rPr lang="ru-RU" dirty="0" smtClean="0"/>
+              <a:t> и может обрабатывать другие запросы</a:t>
+            </a:r>
+            <a:r>
+              <a:rPr lang="en-US" dirty="0" smtClean="0"/>
+              <a:t>.</a:t>
+            </a:r>
+            <a:endParaRPr lang="ru-RU" dirty="0" smtClean="0"/>
+          </a:p>
+          <a:p>
+            <a:r>
+              <a:rPr lang="en-US" dirty="0" smtClean="0"/>
+              <a:t>4. O</a:t>
+            </a:r>
+            <a:r>
+              <a:rPr lang="ru-RU" dirty="0" smtClean="0"/>
+              <a:t>перация завершается, мы возвращаем поток №2 в </a:t>
+            </a:r>
+            <a:r>
+              <a:rPr lang="en-US" dirty="0" err="1" smtClean="0"/>
+              <a:t>ThreadPool</a:t>
+            </a:r>
+            <a:r>
+              <a:rPr lang="en-US" dirty="0" smtClean="0"/>
+              <a:t>, </a:t>
+            </a:r>
+            <a:r>
+              <a:rPr lang="ru-RU" dirty="0" smtClean="0"/>
+              <a:t>берем из него поток</a:t>
+            </a:r>
+            <a:r>
+              <a:rPr lang="en-US" dirty="0" smtClean="0"/>
+              <a:t> </a:t>
+            </a:r>
+            <a:r>
+              <a:rPr lang="ru-RU" dirty="0" smtClean="0"/>
+              <a:t>№3 (который может быть выше упомянутыми, а может и не быть), который продолжает обрабатывать запрос пользователя и выдает результат.</a:t>
+            </a:r>
+          </a:p>
+          <a:p>
+            <a:r>
+              <a:rPr lang="ru-RU" dirty="0" smtClean="0"/>
+              <a:t>5. Серверная платформа отдает результат пользователю</a:t>
+            </a:r>
+            <a:endParaRPr lang="en-US" dirty="0" smtClean="0"/>
+          </a:p>
+          <a:p>
+            <a:endParaRPr lang="en-US" dirty="0" smtClean="0"/>
+          </a:p>
+          <a:p>
+            <a:endParaRPr lang="ru-RU" dirty="0" smtClean="0"/>
+          </a:p>
+          <a:p>
+            <a:pPr lvl="1"/>
+            <a:endParaRPr lang="ru-RU" dirty="0"/>
+          </a:p>
+        </p:txBody>
+      </p:sp>
+    </p:spTree>
+    <p:extLst>
+      <p:ext uri="{BB962C8B-B14F-4D97-AF65-F5344CB8AC3E}">
+        <p14:creationId xmlns:p14="http://schemas.microsoft.com/office/powerpoint/2010/main" val="3125260951"/>
+      </p:ext>
+    </p:extLst>
+  </p:cSld>
+  <p:clrMapOvr>
+    <a:masterClrMapping/>
+  </p:clrMapOvr>
+  <p:timing>
+    <p:tnLst>
+      <p:par>
+        <p:cTn id="1" dur="indefinite" restart="never" nodeType="tmRoot"/>
+      </p:par>
+    </p:tnLst>
+  </p:timing>
+</p:sld>
+</file>
+
+<file path=ppt/slides/slide7.xml><?xml version="1.0" encoding="utf-8"?>
+<p:sld xmlns:a="http://schemas.openxmlformats.org/drawingml/2006/main" xmlns:r="http://schemas.openxmlformats.org/officeDocument/2006/relationships" xmlns:p="http://schemas.openxmlformats.org/presentationml/2006/main">
+  <p:cSld>
+    <p:spTree>
+      <p:nvGrpSpPr>
+        <p:cNvPr id="1" name=""/>
+        <p:cNvGrpSpPr/>
+        <p:nvPr/>
+      </p:nvGrpSpPr>
+      <p:grpSpPr>
+        <a:xfrm>
+          <a:off x="0" y="0"/>
+          <a:ext cx="0" cy="0"/>
+          <a:chOff x="0" y="0"/>
+          <a:chExt cx="0" cy="0"/>
+        </a:xfrm>
+      </p:grpSpPr>
+      <p:sp>
+        <p:nvSpPr>
+          <p:cNvPr id="4" name="Заголовок 3"/>
+          <p:cNvSpPr>
+            <a:spLocks noGrp="1"/>
+          </p:cNvSpPr>
+          <p:nvPr>
+            <p:ph type="title"/>
+          </p:nvPr>
+        </p:nvSpPr>
+        <p:spPr/>
+        <p:txBody>
+          <a:bodyPr/>
+          <a:lstStyle/>
+          <a:p>
+            <a:r>
+              <a:rPr lang="en-US" dirty="0" smtClean="0"/>
+              <a:t>I/O bound </a:t>
+            </a:r>
+            <a:r>
+              <a:rPr lang="ru-RU" dirty="0" smtClean="0"/>
+              <a:t>операции</a:t>
+            </a:r>
+            <a:endParaRPr lang="ru-RU" dirty="0"/>
+          </a:p>
+        </p:txBody>
+      </p:sp>
+      <p:sp>
+        <p:nvSpPr>
+          <p:cNvPr id="5" name="Объект 4"/>
+          <p:cNvSpPr>
+            <a:spLocks noGrp="1"/>
+          </p:cNvSpPr>
+          <p:nvPr>
+            <p:ph idx="1"/>
+          </p:nvPr>
+        </p:nvSpPr>
+        <p:spPr/>
+        <p:txBody>
+          <a:bodyPr>
+            <a:normAutofit fontScale="77500" lnSpcReduction="20000"/>
+          </a:bodyPr>
+          <a:lstStyle/>
+          <a:p>
+            <a:r>
+              <a:rPr lang="ru-RU" dirty="0"/>
+              <a:t>1. Пользователь присылает запрос</a:t>
+            </a:r>
+          </a:p>
+          <a:p>
+            <a:r>
+              <a:rPr lang="ru-RU" dirty="0"/>
+              <a:t>2. Серверная платформа берет поток №1 из ThreadPool, и передает ему этот запрос</a:t>
+            </a:r>
+          </a:p>
+          <a:p>
+            <a:r>
+              <a:rPr lang="ru-RU" dirty="0"/>
+              <a:t>3. Код в потоке начинает выполнять асинхронную операцию. </a:t>
+            </a:r>
+            <a:r>
+              <a:rPr lang="ru-RU" dirty="0" smtClean="0"/>
+              <a:t>Запрос на выполнение операции передается в </a:t>
+            </a:r>
+            <a:r>
+              <a:rPr lang="en-US" dirty="0" smtClean="0"/>
+              <a:t>I/O Completion port. </a:t>
+            </a:r>
+            <a:r>
+              <a:rPr lang="ru-RU" dirty="0" smtClean="0"/>
+              <a:t>Устройство ввода-вывода начинает работу, при этом поток №1 возвращается в </a:t>
+            </a:r>
+            <a:r>
+              <a:rPr lang="en-US" dirty="0" err="1" smtClean="0"/>
+              <a:t>ThreadPool</a:t>
+            </a:r>
+            <a:r>
+              <a:rPr lang="en-US" dirty="0" smtClean="0"/>
+              <a:t> </a:t>
+            </a:r>
+            <a:r>
+              <a:rPr lang="ru-RU" dirty="0" smtClean="0"/>
+              <a:t>и может обрабатывать другие запросы</a:t>
+            </a:r>
+            <a:endParaRPr lang="ru-RU" dirty="0"/>
+          </a:p>
+          <a:p>
+            <a:r>
+              <a:rPr lang="ru-RU" dirty="0"/>
+              <a:t>4. Oперация завершается, </a:t>
+            </a:r>
+            <a:r>
+              <a:rPr lang="ru-RU" dirty="0" smtClean="0"/>
+              <a:t>ее результат обрабатывается </a:t>
+            </a:r>
+            <a:r>
+              <a:rPr lang="en-US" dirty="0" smtClean="0"/>
+              <a:t>I/O thread </a:t>
+            </a:r>
+            <a:r>
+              <a:rPr lang="ru-RU" dirty="0" smtClean="0"/>
+              <a:t>из </a:t>
+            </a:r>
+            <a:r>
+              <a:rPr lang="en-US" dirty="0" err="1" smtClean="0"/>
+              <a:t>ThreadPool</a:t>
+            </a:r>
+            <a:r>
+              <a:rPr lang="ru-RU" dirty="0" smtClean="0"/>
+              <a:t>.</a:t>
+            </a:r>
+            <a:r>
+              <a:rPr lang="en-US" dirty="0" smtClean="0"/>
+              <a:t> </a:t>
+            </a:r>
+            <a:r>
+              <a:rPr lang="ru-RU" dirty="0" smtClean="0"/>
+              <a:t>Этот поток вызывает поток №2 из </a:t>
+            </a:r>
+            <a:r>
+              <a:rPr lang="en-US" dirty="0" err="1" smtClean="0"/>
+              <a:t>ThreadPool</a:t>
+            </a:r>
+            <a:r>
+              <a:rPr lang="en-US" dirty="0" smtClean="0"/>
+              <a:t> </a:t>
+            </a:r>
+            <a:r>
+              <a:rPr lang="ru-RU" dirty="0" smtClean="0"/>
+              <a:t>(который может быть тем что и раньше, а может и не быть), которые продолжает работу, и выдает результат</a:t>
+            </a:r>
+            <a:endParaRPr lang="ru-RU" dirty="0"/>
+          </a:p>
+          <a:p>
+            <a:r>
+              <a:rPr lang="ru-RU" dirty="0"/>
+              <a:t>5. Серверная платформа отдает результат пользователю</a:t>
+            </a:r>
+          </a:p>
+          <a:p>
+            <a:endParaRPr lang="ru-RU" dirty="0" smtClean="0"/>
+          </a:p>
+          <a:p>
+            <a:pPr lvl="1"/>
+            <a:endParaRPr lang="ru-RU" dirty="0"/>
+          </a:p>
+        </p:txBody>
+      </p:sp>
+    </p:spTree>
+    <p:extLst>
+      <p:ext uri="{BB962C8B-B14F-4D97-AF65-F5344CB8AC3E}">
+        <p14:creationId xmlns:p14="http://schemas.microsoft.com/office/powerpoint/2010/main" val="651654801"/>
       </p:ext>
     </p:extLst>
   </p:cSld>
@@ -7334,7 +6810,7 @@
       </p:grpSpPr>
       <p:pic>
         <p:nvPicPr>
-          <p:cNvPr id="4" name="Content Placeholder 3"/>
+          <p:cNvPr id="9" name="Content Placeholder 8"/>
           <p:cNvPicPr>
             <a:picLocks noGrp="1" noChangeAspect="1"/>
           </p:cNvPicPr>
@@ -7342,21 +6818,22 @@
             <p:ph sz="quarter" idx="10"/>
           </p:nvPr>
         </p:nvPicPr>
-        <p:blipFill rotWithShape="1">
-          <a:blip r:embed="rId2" cstate="print">
+        <p:blipFill>
+          <a:blip r:embed="rId2" cstate="screen">
             <a:extLst>
               <a:ext uri="{28A0092B-C50C-407E-A947-70E740481C1C}">
-                <a14:useLocalDpi xmlns:a14="http://schemas.microsoft.com/office/drawing/2010/main" val="0"/>
+                <a14:useLocalDpi xmlns:a14="http://schemas.microsoft.com/office/drawing/2010/main"/>
               </a:ext>
             </a:extLst>
           </a:blip>
-          <a:srcRect/>
-          <a:stretch/>
+          <a:stretch>
+            <a:fillRect/>
+          </a:stretch>
         </p:blipFill>
         <p:spPr>
           <a:xfrm>
-            <a:off x="6096000" y="9000"/>
-            <a:ext cx="6096000" cy="6840000"/>
+            <a:off x="0" y="0"/>
+            <a:ext cx="12192000" cy="6858000"/>
           </a:xfrm>
         </p:spPr>
       </p:pic>
@@ -7371,10 +6848,14 @@
           </p:nvPr>
         </p:nvSpPr>
         <p:spPr>
+          <a:xfrm>
+            <a:off x="0" y="4869000"/>
+            <a:ext cx="12192000" cy="1391829"/>
+          </a:xfrm>
           <a:solidFill>
-            <a:schemeClr val="bg2">
-              <a:lumMod val="25000"/>
-              <a:alpha val="70000"/>
+            <a:schemeClr val="bg1">
+              <a:lumMod val="50000"/>
+              <a:alpha val="80000"/>
             </a:schemeClr>
           </a:solidFill>
         </p:spPr>
@@ -7383,16 +6864,21 @@
           <a:lstStyle/>
           <a:p>
             <a:r>
-              <a:rPr lang="ru-RU" dirty="0"/>
-              <a:t>Будьте аккуратны с цветом подложки и текста.</a:t>
-            </a:r>
+              <a:rPr lang="en-US" dirty="0" smtClean="0"/>
+              <a:t>DEMO: </a:t>
+            </a:r>
+            <a:r>
+              <a:rPr lang="ru-RU" dirty="0" smtClean="0"/>
+              <a:t>Теперь посмотрим в код</a:t>
+            </a:r>
+            <a:endParaRPr lang="ru-RU" dirty="0"/>
           </a:p>
         </p:txBody>
       </p:sp>
     </p:spTree>
     <p:extLst>
       <p:ext uri="{BB962C8B-B14F-4D97-AF65-F5344CB8AC3E}">
-        <p14:creationId xmlns:p14="http://schemas.microsoft.com/office/powerpoint/2010/main" val="548306238"/>
+        <p14:creationId xmlns:p14="http://schemas.microsoft.com/office/powerpoint/2010/main" val="1727222929"/>
       </p:ext>
     </p:extLst>
   </p:cSld>
@@ -7428,12 +6914,12 @@
       </p:grpSpPr>
       <p:sp>
         <p:nvSpPr>
-          <p:cNvPr id="4" name="Заголовок 3"/>
+          <p:cNvPr id="2" name="Title 1"/>
           <p:cNvSpPr>
             <a:spLocks noGrp="1"/>
           </p:cNvSpPr>
           <p:nvPr>
-            <p:ph type="ctrTitle"/>
+            <p:ph type="title"/>
           </p:nvPr>
         </p:nvSpPr>
         <p:spPr/>
@@ -7442,66 +6928,168 @@
           <a:lstStyle/>
           <a:p>
             <a:r>
-              <a:rPr lang="ru-RU" dirty="0" smtClean="0"/>
-              <a:t>АЛЕКСАНДР ЛОЖЕЧКИН</a:t>
-            </a:r>
-            <a:endParaRPr lang="ru-RU" dirty="0"/>
+              <a:rPr lang="en-US" dirty="0" smtClean="0"/>
+              <a:t>Summary</a:t>
+            </a:r>
+            <a:endParaRPr lang="en-US" dirty="0"/>
           </a:p>
         </p:txBody>
       </p:sp>
       <p:sp>
         <p:nvSpPr>
-          <p:cNvPr id="5" name="Подзаголовок 4"/>
+          <p:cNvPr id="3" name="Content Placeholder 2"/>
           <p:cNvSpPr>
             <a:spLocks noGrp="1"/>
           </p:cNvSpPr>
           <p:nvPr>
-            <p:ph type="subTitle" idx="1"/>
+            <p:ph idx="1"/>
           </p:nvPr>
         </p:nvSpPr>
         <p:spPr/>
         <p:txBody>
-          <a:bodyPr/>
+          <a:bodyPr>
+            <a:normAutofit fontScale="92500" lnSpcReduction="20000"/>
+          </a:bodyPr>
           <a:lstStyle/>
           <a:p>
-            <a:pPr marL="0" indent="0">
-              <a:buNone/>
-            </a:pPr>
+            <a:r>
+              <a:rPr lang="ru-RU" dirty="0" smtClean="0"/>
+              <a:t>Не используйте </a:t>
+            </a:r>
             <a:r>
               <a:rPr lang="en-US" dirty="0" smtClean="0"/>
-              <a:t>{Microsoft CEE, DX Lead}</a:t>
+              <a:t>CPU bound </a:t>
+            </a:r>
+            <a:r>
+              <a:rPr lang="ru-RU" dirty="0" smtClean="0"/>
+              <a:t>операции на сервере</a:t>
+            </a:r>
+            <a:endParaRPr lang="en-US" dirty="0"/>
+          </a:p>
+          <a:p>
+            <a:pPr lvl="1"/>
+            <a:r>
+              <a:rPr lang="ru-RU" dirty="0" smtClean="0"/>
+              <a:t>Если серверная платформа работает на основе </a:t>
+            </a:r>
+            <a:r>
+              <a:rPr lang="en-US" dirty="0" err="1" smtClean="0"/>
+              <a:t>ThreadPool</a:t>
+            </a:r>
+            <a:r>
+              <a:rPr lang="ru-RU" dirty="0" smtClean="0"/>
+              <a:t> в </a:t>
+            </a:r>
+            <a:r>
+              <a:rPr lang="en-US" dirty="0" smtClean="0"/>
+              <a:t>.NET </a:t>
+            </a:r>
+            <a:br>
+              <a:rPr lang="en-US" dirty="0" smtClean="0"/>
+            </a:br>
+            <a:r>
+              <a:rPr lang="ru-RU" dirty="0" smtClean="0"/>
+              <a:t>Если масштабируемость важнее времени отклика</a:t>
+            </a:r>
+          </a:p>
+          <a:p>
+            <a:r>
+              <a:rPr lang="ru-RU" dirty="0" smtClean="0"/>
+              <a:t>Всегда используйте </a:t>
+            </a:r>
+            <a:r>
+              <a:rPr lang="en-US" dirty="0" smtClean="0"/>
+              <a:t>I/O bound </a:t>
+            </a:r>
+            <a:r>
+              <a:rPr lang="ru-RU" dirty="0" smtClean="0"/>
+              <a:t>операции, если есть возможность</a:t>
+            </a:r>
+          </a:p>
+          <a:p>
+            <a:pPr lvl="1"/>
+            <a:r>
+              <a:rPr lang="ru-RU" dirty="0" smtClean="0"/>
+              <a:t>Обращайте внимание, что операции по-настоящему </a:t>
+            </a:r>
+            <a:r>
+              <a:rPr lang="en-US" dirty="0" smtClean="0"/>
+              <a:t>I/O bound!</a:t>
+            </a:r>
+            <a:br>
+              <a:rPr lang="en-US" dirty="0" smtClean="0"/>
+            </a:br>
+            <a:r>
+              <a:rPr lang="ru-RU" dirty="0" smtClean="0"/>
+              <a:t>Версионность сообщений в </a:t>
+            </a:r>
+            <a:r>
+              <a:rPr lang="en-US" dirty="0" smtClean="0"/>
+              <a:t>Azure Queues</a:t>
+            </a:r>
+            <a:br>
+              <a:rPr lang="en-US" dirty="0" smtClean="0"/>
+            </a:br>
+            <a:r>
+              <a:rPr lang="ru-RU" dirty="0" smtClean="0"/>
+              <a:t>Подумайте о режиме </a:t>
+            </a:r>
+            <a:r>
+              <a:rPr lang="en-US" dirty="0" smtClean="0"/>
+              <a:t>read-only</a:t>
+            </a:r>
+            <a:endParaRPr lang="ru-RU" dirty="0" smtClean="0"/>
+          </a:p>
+          <a:p>
+            <a:r>
+              <a:rPr lang="ru-RU" dirty="0" smtClean="0"/>
+              <a:t>Всегда осторожно используйте асинхронность</a:t>
+            </a:r>
+          </a:p>
+          <a:p>
+            <a:pPr lvl="1"/>
+            <a:r>
+              <a:rPr lang="ru-RU" dirty="0" smtClean="0"/>
+              <a:t>Только там где это действительно нужно</a:t>
+            </a:r>
+            <a:br>
+              <a:rPr lang="ru-RU" dirty="0" smtClean="0"/>
+            </a:br>
+            <a:r>
+              <a:rPr lang="ru-RU" dirty="0" smtClean="0"/>
+              <a:t>Если видите </a:t>
+            </a:r>
+            <a:r>
+              <a:rPr lang="en-US" dirty="0" smtClean="0"/>
+              <a:t>await – </a:t>
+            </a:r>
+            <a:r>
+              <a:rPr lang="ru-RU" dirty="0" smtClean="0"/>
+              <a:t>проверьте себя</a:t>
+            </a:r>
+            <a:r>
+              <a:rPr lang="ru-RU" dirty="0"/>
+              <a:t/>
+            </a:r>
+            <a:br>
+              <a:rPr lang="ru-RU" dirty="0"/>
+            </a:br>
+            <a:r>
+              <a:rPr lang="ru-RU" dirty="0" smtClean="0"/>
+              <a:t>Если пишите библиотеку с асинхронным кодом – проверьте себя</a:t>
             </a:r>
             <a:endParaRPr lang="ru-RU" dirty="0"/>
+          </a:p>
+          <a:p>
+            <a:pPr lvl="1"/>
+            <a:endParaRPr lang="ru-RU" dirty="0" smtClean="0"/>
           </a:p>
         </p:txBody>
       </p:sp>
-      <p:pic>
-        <p:nvPicPr>
-          <p:cNvPr id="3" name="Рисунок 2"/>
-          <p:cNvPicPr>
-            <a:picLocks noGrp="1" noChangeAspect="1"/>
-          </p:cNvPicPr>
-          <p:nvPr>
-            <p:ph type="pic" sz="quarter" idx="10"/>
-          </p:nvPr>
-        </p:nvPicPr>
-        <p:blipFill rotWithShape="1">
-          <a:blip r:embed="rId2" cstate="print">
-            <a:extLst>
-              <a:ext uri="{28A0092B-C50C-407E-A947-70E740481C1C}">
-                <a14:useLocalDpi xmlns:a14="http://schemas.microsoft.com/office/drawing/2010/main" val="0"/>
-              </a:ext>
-            </a:extLst>
-          </a:blip>
-          <a:srcRect t="-3"/>
-          <a:stretch/>
-        </p:blipFill>
-        <p:spPr/>
-      </p:pic>
     </p:spTree>
     <p:extLst>
       <p:ext uri="{BB962C8B-B14F-4D97-AF65-F5344CB8AC3E}">
-        <p14:creationId xmlns:p14="http://schemas.microsoft.com/office/powerpoint/2010/main" val="288244254"/>
+        <p14:creationId xmlns:p14="http://schemas.microsoft.com/office/powerpoint/2010/main" val="2839569594"/>
       </p:ext>
     </p:extLst>
   </p:cSld>
@@ -8242,18 +7830,18 @@
 </file>
 
 <file path=customXml/item1.xml><?xml version="1.0" encoding="utf-8"?>
+<p:properties xmlns:p="http://schemas.microsoft.com/office/2006/metadata/properties" xmlns:xsi="http://www.w3.org/2001/XMLSchema-instance" xmlns:pc="http://schemas.microsoft.com/office/infopath/2007/PartnerControls">
+  <documentManagement/>
+</p:properties>
+</file>
+
+<file path=customXml/item2.xml><?xml version="1.0" encoding="utf-8"?>
 <?mso-contentType ?>
 <FormTemplates xmlns="http://schemas.microsoft.com/sharepoint/v3/contenttype/forms">
   <Display>DocumentLibraryForm</Display>
   <Edit>DocumentLibraryForm</Edit>
   <New>DocumentLibraryForm</New>
 </FormTemplates>
-</file>
-
-<file path=customXml/item2.xml><?xml version="1.0" encoding="utf-8"?>
-<p:properties xmlns:p="http://schemas.microsoft.com/office/2006/metadata/properties" xmlns:xsi="http://www.w3.org/2001/XMLSchema-instance" xmlns:pc="http://schemas.microsoft.com/office/infopath/2007/PartnerControls">
-  <documentManagement/>
-</p:properties>
 </file>
 
 <file path=customXml/item3.xml><?xml version="1.0" encoding="utf-8"?>
@@ -8397,25 +7985,25 @@
 </file>
 
 <file path=customXml/itemProps1.xml><?xml version="1.0" encoding="utf-8"?>
-<ds:datastoreItem xmlns:ds="http://schemas.openxmlformats.org/officeDocument/2006/customXml" ds:itemID="{AE2C73D0-6452-4B74-876E-F854C149D3F2}">
+<ds:datastoreItem xmlns:ds="http://schemas.openxmlformats.org/officeDocument/2006/customXml" ds:itemID="{A5A1518E-3F6D-4166-8FC6-37AEE79B374E}">
   <ds:schemaRefs>
-    <ds:schemaRef ds:uri="http://schemas.microsoft.com/sharepoint/v3/contenttype/forms"/>
+    <ds:schemaRef ds:uri="http://schemas.microsoft.com/office/infopath/2007/PartnerControls"/>
+    <ds:schemaRef ds:uri="http://purl.org/dc/elements/1.1/"/>
+    <ds:schemaRef ds:uri="http://schemas.microsoft.com/office/2006/metadata/properties"/>
+    <ds:schemaRef ds:uri="http://schemas.microsoft.com/office/2006/documentManagement/types"/>
+    <ds:schemaRef ds:uri="83163233-208f-487d-8d66-a814ca9ada95"/>
+    <ds:schemaRef ds:uri="http://purl.org/dc/terms/"/>
+    <ds:schemaRef ds:uri="http://schemas.openxmlformats.org/package/2006/metadata/core-properties"/>
+    <ds:schemaRef ds:uri="http://purl.org/dc/dcmitype/"/>
+    <ds:schemaRef ds:uri="http://www.w3.org/XML/1998/namespace"/>
   </ds:schemaRefs>
 </ds:datastoreItem>
 </file>
 
 <file path=customXml/itemProps2.xml><?xml version="1.0" encoding="utf-8"?>
-<ds:datastoreItem xmlns:ds="http://schemas.openxmlformats.org/officeDocument/2006/customXml" ds:itemID="{A5A1518E-3F6D-4166-8FC6-37AEE79B374E}">
+<ds:datastoreItem xmlns:ds="http://schemas.openxmlformats.org/officeDocument/2006/customXml" ds:itemID="{AE2C73D0-6452-4B74-876E-F854C149D3F2}">
   <ds:schemaRefs>
-    <ds:schemaRef ds:uri="83163233-208f-487d-8d66-a814ca9ada95"/>
-    <ds:schemaRef ds:uri="http://purl.org/dc/terms/"/>
-    <ds:schemaRef ds:uri="http://schemas.openxmlformats.org/package/2006/metadata/core-properties"/>
-    <ds:schemaRef ds:uri="http://schemas.microsoft.com/office/2006/documentManagement/types"/>
-    <ds:schemaRef ds:uri="http://schemas.microsoft.com/office/infopath/2007/PartnerControls"/>
-    <ds:schemaRef ds:uri="http://purl.org/dc/elements/1.1/"/>
-    <ds:schemaRef ds:uri="http://schemas.microsoft.com/office/2006/metadata/properties"/>
-    <ds:schemaRef ds:uri="http://www.w3.org/XML/1998/namespace"/>
-    <ds:schemaRef ds:uri="http://purl.org/dc/dcmitype/"/>
+    <ds:schemaRef ds:uri="http://schemas.microsoft.com/sharepoint/v3/contenttype/forms"/>
   </ds:schemaRefs>
 </ds:datastoreItem>
 </file>

</xml_diff>